<commit_message>
fix: fix overflow title
</commit_message>
<xml_diff>
--- a/backend/src/core_ai/pptx_templates/FIT-HCMUS_template.pptx
+++ b/backend/src/core_ai/pptx_templates/FIT-HCMUS_template.pptx
@@ -244,7 +244,7 @@
       <p15:sldGuideLst xmlns:p15="http://schemas.microsoft.com/office/powerpoint/2012/main"/>
     </p:ext>
     <p:ext uri="GoogleSlidesCustomDataVersion2">
-      <go:slidesCustomData xmlns:go="http://customooxmlschemas.google.com/" xmlns:ahyp="http://schemas.microsoft.com/office/drawing/2018/hyperlinkcolor" xmlns:p15="http://schemas.microsoft.com/office/powerpoint/2012/main" xmlns:p14="http://schemas.microsoft.com/office/powerpoint/2010/main" xmlns:com="http://schemas.openxmlformats.org/drawingml/2006/compatibility" xmlns:pvml="urn:schemas-microsoft-com:office:powerpoint" xmlns:v="urn:schemas-microsoft-com:vml" xmlns:o="urn:schemas-microsoft-com:office:office" xmlns:dgm="http://schemas.openxmlformats.org/drawingml/2006/diagram" xmlns:c="http://schemas.openxmlformats.org/drawingml/2006/chart" xmlns:mv="urn:schemas-microsoft-com:mac:vml" xmlns:mc="http://schemas.openxmlformats.org/markup-compatibility/2006" xmlns="" r:id="rId6" roundtripDataSignature="AMtx7mhQ3tBUQi5bpBH/gRacCwppiNReSA=="/>
+      <go:slidesCustomData xmlns="" xmlns:mc="http://schemas.openxmlformats.org/markup-compatibility/2006" xmlns:mv="urn:schemas-microsoft-com:mac:vml" xmlns:c="http://schemas.openxmlformats.org/drawingml/2006/chart" xmlns:dgm="http://schemas.openxmlformats.org/drawingml/2006/diagram" xmlns:o="urn:schemas-microsoft-com:office:office" xmlns:v="urn:schemas-microsoft-com:vml" xmlns:pvml="urn:schemas-microsoft-com:office:powerpoint" xmlns:com="http://schemas.openxmlformats.org/drawingml/2006/compatibility" xmlns:p14="http://schemas.microsoft.com/office/powerpoint/2010/main" xmlns:p15="http://schemas.microsoft.com/office/powerpoint/2012/main" xmlns:ahyp="http://schemas.microsoft.com/office/drawing/2018/hyperlinkcolor" xmlns:go="http://customooxmlschemas.google.com/" r:id="rId6" roundtripDataSignature="AMtx7mhQ3tBUQi5bpBH/gRacCwppiNReSA=="/>
     </p:ext>
   </p:extLst>
 </p:presentation>
@@ -8343,9 +8343,10 @@
           <a:p>
             <a:pPr lvl="0"/>
             <a:r>
-              <a:rPr lang="en-US"/>
-              <a:t>00</a:t>
-            </a:r>
+              <a:rPr lang="en-US" dirty="0" smtClean="0"/>
+              <a:t>01</a:t>
+            </a:r>
+            <a:endParaRPr lang="en-US" dirty="0"/>
           </a:p>
         </p:txBody>
       </p:sp>
@@ -8603,9 +8604,10 @@
           <a:p>
             <a:pPr lvl="0"/>
             <a:r>
-              <a:rPr lang="en-US"/>
-              <a:t>00</a:t>
-            </a:r>
+              <a:rPr lang="en-US" dirty="0" smtClean="0"/>
+              <a:t>01</a:t>
+            </a:r>
+            <a:endParaRPr lang="en-US" dirty="0"/>
           </a:p>
         </p:txBody>
       </p:sp>

</xml_diff>